<commit_message>
Worked on intro presentation
</commit_message>
<xml_diff>
--- a/intro-presentation/intro.pptx
+++ b/intro-presentation/intro.pptx
@@ -5,14 +5,16 @@
     <p:sldMasterId id="2147483678" r:id="rId1"/>
   </p:sldMasterIdLst>
   <p:notesMasterIdLst>
-    <p:notesMasterId r:id="rId4"/>
+    <p:notesMasterId r:id="rId6"/>
   </p:notesMasterIdLst>
   <p:handoutMasterIdLst>
-    <p:handoutMasterId r:id="rId5"/>
+    <p:handoutMasterId r:id="rId7"/>
   </p:handoutMasterIdLst>
   <p:sldIdLst>
     <p:sldId id="256" r:id="rId2"/>
     <p:sldId id="257" r:id="rId3"/>
+    <p:sldId id="258" r:id="rId4"/>
+    <p:sldId id="259" r:id="rId5"/>
   </p:sldIdLst>
   <p:sldSz cx="9144000" cy="6858000" type="screen4x3"/>
   <p:notesSz cx="7099300" cy="10234613"/>
@@ -1048,7 +1050,6 @@
               <a:rPr lang="de-DE" smtClean="0"/>
               <a:t>Master-Untertitelformat bearbeiten</a:t>
             </a:r>
-            <a:endParaRPr lang="de-DE" smtClean="0"/>
           </a:p>
         </p:txBody>
       </p:sp>
@@ -1083,7 +1084,6 @@
               <a:rPr lang="de-DE" smtClean="0"/>
               <a:t>Mastertitelformat bearbeiten</a:t>
             </a:r>
-            <a:endParaRPr lang="de-DE" smtClean="0"/>
           </a:p>
         </p:txBody>
       </p:sp>
@@ -1129,7 +1129,7 @@
         <p:spPr bwMode="auto">
           <a:xfrm>
             <a:off x="260350" y="295275"/>
-            <a:ext cx="4321175" cy="273050"/>
+            <a:ext cx="4321175" cy="276999"/>
           </a:xfrm>
           <a:prstGeom prst="rect">
             <a:avLst/>
@@ -1158,14 +1158,29 @@
               </a:spcBef>
             </a:pPr>
             <a:r>
-              <a:rPr lang="de-DE" sz="1000" b="1">
+              <a:rPr lang="de-DE" sz="1000" b="1" dirty="0" smtClean="0">
                 <a:solidFill>
                   <a:srgbClr val="5F5F5F"/>
                 </a:solidFill>
                 <a:cs typeface="Arial" charset="0"/>
               </a:rPr>
-              <a:t>Titel, Vorname, Name</a:t>
-            </a:r>
+              <a:t>David</a:t>
+            </a:r>
+            <a:r>
+              <a:rPr lang="de-DE" sz="1000" b="1" baseline="0" dirty="0" smtClean="0">
+                <a:solidFill>
+                  <a:srgbClr val="5F5F5F"/>
+                </a:solidFill>
+                <a:cs typeface="Arial" charset="0"/>
+              </a:rPr>
+              <a:t> Bohn</a:t>
+            </a:r>
+            <a:endParaRPr lang="de-DE" sz="1000" b="1" dirty="0">
+              <a:solidFill>
+                <a:srgbClr val="5F5F5F"/>
+              </a:solidFill>
+              <a:cs typeface="Arial" charset="0"/>
+            </a:endParaRPr>
           </a:p>
           <a:p>
             <a:pPr eaLnBrk="0" hangingPunct="0">
@@ -1177,14 +1192,20 @@
               </a:spcBef>
             </a:pPr>
             <a:r>
-              <a:rPr lang="de-DE" sz="1000" b="1">
+              <a:rPr lang="de-DE" sz="1000" b="1" dirty="0" smtClean="0">
                 <a:solidFill>
                   <a:srgbClr val="5F5F5F"/>
                 </a:solidFill>
                 <a:cs typeface="Arial" charset="0"/>
               </a:rPr>
-              <a:t>Abteilung, Fachbereich oder Institut</a:t>
-            </a:r>
+              <a:t>Institut für Informatik</a:t>
+            </a:r>
+            <a:endParaRPr lang="de-DE" sz="1000" b="1" dirty="0">
+              <a:solidFill>
+                <a:srgbClr val="5F5F5F"/>
+              </a:solidFill>
+              <a:cs typeface="Arial" charset="0"/>
+            </a:endParaRPr>
           </a:p>
         </p:txBody>
       </p:sp>
@@ -2935,7 +2956,6 @@
               <a:rPr lang="de-DE" noProof="0" smtClean="0"/>
               <a:t>Bild auf Platzhalter ziehen oder durch Klicken auf Symbol hinzufügen</a:t>
             </a:r>
-            <a:endParaRPr lang="de-DE" noProof="0" smtClean="0"/>
           </a:p>
         </p:txBody>
       </p:sp>
@@ -3862,8 +3882,12 @@
           <a:lstStyle/>
           <a:p>
             <a:r>
+              <a:rPr lang="de-DE" dirty="0" smtClean="0"/>
+              <a:t>Information Dissemination </a:t>
+            </a:r>
+            <a:r>
               <a:rPr lang="de-DE" dirty="0" err="1" smtClean="0"/>
-              <a:t>Evaluating</a:t>
+              <a:t>With</a:t>
             </a:r>
             <a:r>
               <a:rPr lang="de-DE" dirty="0" smtClean="0"/>
@@ -3871,7 +3895,7 @@
             </a:r>
             <a:r>
               <a:rPr lang="de-DE" dirty="0" err="1" smtClean="0"/>
-              <a:t>gossip</a:t>
+              <a:t>Gossiping</a:t>
             </a:r>
             <a:r>
               <a:rPr lang="de-DE" dirty="0" smtClean="0"/>
@@ -3879,43 +3903,19 @@
             </a:r>
             <a:r>
               <a:rPr lang="de-DE" dirty="0" err="1" smtClean="0"/>
-              <a:t>information</a:t>
+              <a:t>Using</a:t>
             </a:r>
             <a:r>
               <a:rPr lang="de-DE" dirty="0" smtClean="0"/>
-              <a:t> </a:t>
+              <a:t> The </a:t>
             </a:r>
             <a:r>
               <a:rPr lang="de-DE" dirty="0" err="1" smtClean="0"/>
-              <a:t>dissemination</a:t>
+              <a:t>IoT</a:t>
             </a:r>
             <a:r>
               <a:rPr lang="de-DE" dirty="0" smtClean="0"/>
-              <a:t> </a:t>
-            </a:r>
-            <a:r>
-              <a:rPr lang="de-DE" dirty="0" err="1" smtClean="0"/>
-              <a:t>strategies</a:t>
-            </a:r>
-            <a:r>
-              <a:rPr lang="de-DE" dirty="0" smtClean="0"/>
-              <a:t> </a:t>
-            </a:r>
-            <a:r>
-              <a:rPr lang="de-DE" dirty="0" err="1" smtClean="0"/>
-              <a:t>using</a:t>
-            </a:r>
-            <a:r>
-              <a:rPr lang="de-DE" dirty="0" smtClean="0"/>
-              <a:t> </a:t>
-            </a:r>
-            <a:r>
-              <a:rPr lang="de-DE" dirty="0" err="1" smtClean="0"/>
-              <a:t>the</a:t>
-            </a:r>
-            <a:r>
-              <a:rPr lang="de-DE" dirty="0" smtClean="0"/>
-              <a:t> IOT-Lab</a:t>
+              <a:t>-Lab</a:t>
             </a:r>
             <a:endParaRPr lang="de-DE" dirty="0"/>
           </a:p>
@@ -3945,32 +3945,6 @@
               <a:t>introduction</a:t>
             </a:r>
             <a:endParaRPr lang="de-DE" dirty="0"/>
-          </a:p>
-        </p:txBody>
-      </p:sp>
-      <p:sp>
-        <p:nvSpPr>
-          <p:cNvPr id="2" name="Textfeld 1"/>
-          <p:cNvSpPr txBox="1"/>
-          <p:nvPr/>
-        </p:nvSpPr>
-        <p:spPr>
-          <a:xfrm>
-            <a:off x="714703" y="315310"/>
-            <a:ext cx="184731" cy="369332"/>
-          </a:xfrm>
-          <a:prstGeom prst="rect">
-            <a:avLst/>
-          </a:prstGeom>
-          <a:noFill/>
-        </p:spPr>
-        <p:txBody>
-          <a:bodyPr wrap="none" rtlCol="0">
-            <a:spAutoFit/>
-          </a:bodyPr>
-          <a:lstStyle/>
-          <a:p>
-            <a:endParaRPr lang="de-DE"/>
           </a:p>
         </p:txBody>
       </p:sp>
@@ -3980,6 +3954,13 @@
     <a:masterClrMapping/>
   </p:clrMapOvr>
   <p:transition spd="slow"/>
+  <p:timing>
+    <p:tnLst>
+      <p:par>
+        <p:cTn id="1" dur="indefinite" restart="never" nodeType="tmRoot"/>
+      </p:par>
+    </p:tnLst>
+  </p:timing>
 </p:sld>
 </file>
 
@@ -4018,7 +3999,7 @@
           <a:lstStyle/>
           <a:p>
             <a:r>
-              <a:rPr lang="de-DE"/>
+              <a:rPr lang="de-DE" dirty="0"/>
               <a:t>Titel, Datum</a:t>
             </a:r>
           </a:p>
@@ -4039,7 +4020,23 @@
           <a:bodyPr/>
           <a:lstStyle/>
           <a:p>
-            <a:endParaRPr lang="de-DE" smtClean="0"/>
+            <a:r>
+              <a:rPr lang="de-DE" dirty="0" err="1" smtClean="0"/>
+              <a:t>Structure</a:t>
+            </a:r>
+            <a:r>
+              <a:rPr lang="de-DE" dirty="0" smtClean="0"/>
+              <a:t> </a:t>
+            </a:r>
+            <a:r>
+              <a:rPr lang="de-DE" dirty="0" err="1" smtClean="0"/>
+              <a:t>Of</a:t>
+            </a:r>
+            <a:r>
+              <a:rPr lang="de-DE" dirty="0" smtClean="0"/>
+              <a:t> This Talk</a:t>
+            </a:r>
+            <a:endParaRPr lang="de-DE" dirty="0" smtClean="0"/>
           </a:p>
         </p:txBody>
       </p:sp>
@@ -4058,11 +4055,336 @@
           <a:bodyPr/>
           <a:lstStyle/>
           <a:p>
-            <a:endParaRPr lang="de-DE" smtClean="0"/>
+            <a:pPr marL="285750" indent="-285750">
+              <a:buFont typeface="Arial" charset="0"/>
+              <a:buChar char="•"/>
+            </a:pPr>
+            <a:r>
+              <a:rPr lang="de-DE" dirty="0" err="1" smtClean="0"/>
+              <a:t>Principles</a:t>
+            </a:r>
+            <a:r>
+              <a:rPr lang="de-DE" dirty="0" smtClean="0"/>
+              <a:t> </a:t>
+            </a:r>
+            <a:r>
+              <a:rPr lang="de-DE" dirty="0" err="1" smtClean="0"/>
+              <a:t>of</a:t>
+            </a:r>
+            <a:r>
+              <a:rPr lang="de-DE" dirty="0" smtClean="0"/>
+              <a:t> </a:t>
+            </a:r>
+            <a:r>
+              <a:rPr lang="de-DE" dirty="0" err="1" smtClean="0"/>
+              <a:t>Gossiping</a:t>
+            </a:r>
+            <a:endParaRPr lang="de-DE" dirty="0" smtClean="0"/>
+          </a:p>
+          <a:p>
+            <a:pPr marL="285750" indent="-285750">
+              <a:buFont typeface="Arial" charset="0"/>
+              <a:buChar char="•"/>
+            </a:pPr>
+            <a:r>
+              <a:rPr lang="de-DE" dirty="0" smtClean="0"/>
+              <a:t>The </a:t>
+            </a:r>
+            <a:r>
+              <a:rPr lang="de-DE" dirty="0" err="1" smtClean="0"/>
+              <a:t>IoT</a:t>
+            </a:r>
+            <a:r>
+              <a:rPr lang="de-DE" dirty="0" smtClean="0"/>
+              <a:t>-Lab</a:t>
+            </a:r>
+          </a:p>
+          <a:p>
+            <a:pPr marL="285750" indent="-285750">
+              <a:buFont typeface="Arial" charset="0"/>
+              <a:buChar char="•"/>
+            </a:pPr>
+            <a:r>
+              <a:rPr lang="de-DE" dirty="0" err="1" smtClean="0"/>
+              <a:t>Scope</a:t>
+            </a:r>
+            <a:r>
+              <a:rPr lang="de-DE" dirty="0" smtClean="0"/>
+              <a:t> </a:t>
+            </a:r>
+            <a:r>
+              <a:rPr lang="de-DE" dirty="0" err="1" smtClean="0"/>
+              <a:t>of</a:t>
+            </a:r>
+            <a:r>
+              <a:rPr lang="de-DE" dirty="0" smtClean="0"/>
+              <a:t> </a:t>
+            </a:r>
+            <a:r>
+              <a:rPr lang="de-DE" dirty="0" err="1" smtClean="0"/>
+              <a:t>the</a:t>
+            </a:r>
+            <a:r>
+              <a:rPr lang="de-DE" dirty="0" smtClean="0"/>
+              <a:t> Thesis</a:t>
+            </a:r>
+          </a:p>
+          <a:p>
+            <a:pPr marL="285750" indent="-285750">
+              <a:buFont typeface="Arial" charset="0"/>
+              <a:buChar char="•"/>
+            </a:pPr>
+            <a:r>
+              <a:rPr lang="de-DE" dirty="0" smtClean="0"/>
+              <a:t>Roadmap</a:t>
+            </a:r>
+            <a:endParaRPr lang="de-DE" dirty="0" smtClean="0"/>
           </a:p>
         </p:txBody>
       </p:sp>
     </p:spTree>
+  </p:cSld>
+  <p:clrMapOvr>
+    <a:masterClrMapping/>
+  </p:clrMapOvr>
+  <p:transition spd="slow"/>
+  <p:timing>
+    <p:tnLst>
+      <p:par>
+        <p:cTn id="1" dur="indefinite" restart="never" nodeType="tmRoot"/>
+      </p:par>
+    </p:tnLst>
+  </p:timing>
+</p:sld>
+</file>
+
+<file path=ppt/slides/slide3.xml><?xml version="1.0" encoding="utf-8"?>
+<p:sld xmlns:a="http://schemas.openxmlformats.org/drawingml/2006/main" xmlns:r="http://schemas.openxmlformats.org/officeDocument/2006/relationships" xmlns:p="http://schemas.openxmlformats.org/presentationml/2006/main">
+  <p:cSld>
+    <p:spTree>
+      <p:nvGrpSpPr>
+        <p:cNvPr id="1" name=""/>
+        <p:cNvGrpSpPr/>
+        <p:nvPr/>
+      </p:nvGrpSpPr>
+      <p:grpSpPr>
+        <a:xfrm>
+          <a:off x="0" y="0"/>
+          <a:ext cx="0" cy="0"/>
+          <a:chOff x="0" y="0"/>
+          <a:chExt cx="0" cy="0"/>
+        </a:xfrm>
+      </p:grpSpPr>
+      <p:sp>
+        <p:nvSpPr>
+          <p:cNvPr id="2" name="Titel 1"/>
+          <p:cNvSpPr>
+            <a:spLocks noGrp="1"/>
+          </p:cNvSpPr>
+          <p:nvPr>
+            <p:ph type="title"/>
+          </p:nvPr>
+        </p:nvSpPr>
+        <p:spPr/>
+        <p:txBody>
+          <a:bodyPr/>
+          <a:lstStyle/>
+          <a:p>
+            <a:r>
+              <a:rPr lang="de-DE" dirty="0" err="1" smtClean="0"/>
+              <a:t>Principles</a:t>
+            </a:r>
+            <a:r>
+              <a:rPr lang="de-DE" dirty="0" smtClean="0"/>
+              <a:t> </a:t>
+            </a:r>
+            <a:r>
+              <a:rPr lang="de-DE" dirty="0" err="1" smtClean="0"/>
+              <a:t>of</a:t>
+            </a:r>
+            <a:r>
+              <a:rPr lang="de-DE" dirty="0" smtClean="0"/>
+              <a:t> </a:t>
+            </a:r>
+            <a:r>
+              <a:rPr lang="de-DE" dirty="0" err="1" smtClean="0"/>
+              <a:t>Gossiping</a:t>
+            </a:r>
+            <a:endParaRPr lang="de-DE" dirty="0"/>
+          </a:p>
+        </p:txBody>
+      </p:sp>
+      <p:sp>
+        <p:nvSpPr>
+          <p:cNvPr id="3" name="Inhaltsplatzhalter 2"/>
+          <p:cNvSpPr>
+            <a:spLocks noGrp="1"/>
+          </p:cNvSpPr>
+          <p:nvPr>
+            <p:ph idx="1"/>
+          </p:nvPr>
+        </p:nvSpPr>
+        <p:spPr/>
+        <p:txBody>
+          <a:bodyPr/>
+          <a:lstStyle/>
+          <a:p>
+            <a:endParaRPr lang="de-DE"/>
+          </a:p>
+        </p:txBody>
+      </p:sp>
+      <p:sp>
+        <p:nvSpPr>
+          <p:cNvPr id="4" name="Fußzeilenplatzhalter 3"/>
+          <p:cNvSpPr>
+            <a:spLocks noGrp="1"/>
+          </p:cNvSpPr>
+          <p:nvPr>
+            <p:ph type="ftr" sz="quarter" idx="10"/>
+          </p:nvPr>
+        </p:nvSpPr>
+        <p:spPr/>
+        <p:txBody>
+          <a:bodyPr/>
+          <a:lstStyle/>
+          <a:p>
+            <a:r>
+              <a:rPr lang="de-DE" smtClean="0"/>
+              <a:t>Titel, Datum</a:t>
+            </a:r>
+            <a:endParaRPr lang="de-DE"/>
+          </a:p>
+        </p:txBody>
+      </p:sp>
+    </p:spTree>
+    <p:extLst>
+      <p:ext uri="{BB962C8B-B14F-4D97-AF65-F5344CB8AC3E}">
+        <p14:creationId xmlns:p14="http://schemas.microsoft.com/office/powerpoint/2010/main" val="1476153275"/>
+      </p:ext>
+    </p:extLst>
+  </p:cSld>
+  <p:clrMapOvr>
+    <a:masterClrMapping/>
+  </p:clrMapOvr>
+  <p:transition spd="slow"/>
+</p:sld>
+</file>
+
+<file path=ppt/slides/slide4.xml><?xml version="1.0" encoding="utf-8"?>
+<p:sld xmlns:a="http://schemas.openxmlformats.org/drawingml/2006/main" xmlns:r="http://schemas.openxmlformats.org/officeDocument/2006/relationships" xmlns:p="http://schemas.openxmlformats.org/presentationml/2006/main">
+  <p:cSld>
+    <p:spTree>
+      <p:nvGrpSpPr>
+        <p:cNvPr id="1" name=""/>
+        <p:cNvGrpSpPr/>
+        <p:nvPr/>
+      </p:nvGrpSpPr>
+      <p:grpSpPr>
+        <a:xfrm>
+          <a:off x="0" y="0"/>
+          <a:ext cx="0" cy="0"/>
+          <a:chOff x="0" y="0"/>
+          <a:chExt cx="0" cy="0"/>
+        </a:xfrm>
+      </p:grpSpPr>
+      <p:sp>
+        <p:nvSpPr>
+          <p:cNvPr id="2" name="Titel 1"/>
+          <p:cNvSpPr>
+            <a:spLocks noGrp="1"/>
+          </p:cNvSpPr>
+          <p:nvPr>
+            <p:ph type="title"/>
+          </p:nvPr>
+        </p:nvSpPr>
+        <p:spPr/>
+        <p:txBody>
+          <a:bodyPr/>
+          <a:lstStyle/>
+          <a:p>
+            <a:r>
+              <a:rPr lang="de-DE" dirty="0" smtClean="0"/>
+              <a:t>The </a:t>
+            </a:r>
+            <a:r>
+              <a:rPr lang="de-DE" dirty="0" err="1" smtClean="0"/>
+              <a:t>IoT</a:t>
+            </a:r>
+            <a:r>
+              <a:rPr lang="de-DE" dirty="0" smtClean="0"/>
+              <a:t>-Lab</a:t>
+            </a:r>
+            <a:endParaRPr lang="de-DE" dirty="0"/>
+          </a:p>
+        </p:txBody>
+      </p:sp>
+      <p:sp>
+        <p:nvSpPr>
+          <p:cNvPr id="5" name="Inhaltsplatzhalter 4"/>
+          <p:cNvSpPr>
+            <a:spLocks noGrp="1"/>
+          </p:cNvSpPr>
+          <p:nvPr>
+            <p:ph sz="half" idx="1"/>
+          </p:nvPr>
+        </p:nvSpPr>
+        <p:spPr/>
+        <p:txBody>
+          <a:bodyPr/>
+          <a:lstStyle/>
+          <a:p>
+            <a:endParaRPr lang="de-DE"/>
+          </a:p>
+        </p:txBody>
+      </p:sp>
+      <p:sp>
+        <p:nvSpPr>
+          <p:cNvPr id="6" name="Inhaltsplatzhalter 5"/>
+          <p:cNvSpPr>
+            <a:spLocks noGrp="1"/>
+          </p:cNvSpPr>
+          <p:nvPr>
+            <p:ph sz="half" idx="2"/>
+          </p:nvPr>
+        </p:nvSpPr>
+        <p:spPr/>
+        <p:txBody>
+          <a:bodyPr/>
+          <a:lstStyle/>
+          <a:p>
+            <a:endParaRPr lang="de-DE"/>
+          </a:p>
+        </p:txBody>
+      </p:sp>
+      <p:sp>
+        <p:nvSpPr>
+          <p:cNvPr id="4" name="Fußzeilenplatzhalter 3"/>
+          <p:cNvSpPr>
+            <a:spLocks noGrp="1"/>
+          </p:cNvSpPr>
+          <p:nvPr>
+            <p:ph type="ftr" sz="quarter" idx="10"/>
+          </p:nvPr>
+        </p:nvSpPr>
+        <p:spPr/>
+        <p:txBody>
+          <a:bodyPr/>
+          <a:lstStyle/>
+          <a:p>
+            <a:r>
+              <a:rPr lang="de-DE" smtClean="0"/>
+              <a:t>Titel, Datum</a:t>
+            </a:r>
+            <a:endParaRPr lang="de-DE"/>
+          </a:p>
+        </p:txBody>
+      </p:sp>
+    </p:spTree>
+    <p:extLst>
+      <p:ext uri="{BB962C8B-B14F-4D97-AF65-F5344CB8AC3E}">
+        <p14:creationId xmlns:p14="http://schemas.microsoft.com/office/powerpoint/2010/main" val="532670688"/>
+      </p:ext>
+    </p:extLst>
   </p:cSld>
   <p:clrMapOvr>
     <a:masterClrMapping/>

</xml_diff>